<commit_message>
Create generate_conditionlabels script and update code_map
</commit_message>
<xml_diff>
--- a/code_map.pptx
+++ b/code_map.pptx
@@ -259,7 +259,7 @@
           <a:p>
             <a:fld id="{75971C63-3134-492E-9112-1D5D7F800776}" type="datetimeFigureOut">
               <a:rPr lang="en-US" smtClean="0"/>
-              <a:t>4/30/2025</a:t>
+              <a:t>5/15/2025</a:t>
             </a:fld>
             <a:endParaRPr lang="en-US"/>
           </a:p>
@@ -457,7 +457,7 @@
           <a:p>
             <a:fld id="{75971C63-3134-492E-9112-1D5D7F800776}" type="datetimeFigureOut">
               <a:rPr lang="en-US" smtClean="0"/>
-              <a:t>4/30/2025</a:t>
+              <a:t>5/15/2025</a:t>
             </a:fld>
             <a:endParaRPr lang="en-US"/>
           </a:p>
@@ -665,7 +665,7 @@
           <a:p>
             <a:fld id="{75971C63-3134-492E-9112-1D5D7F800776}" type="datetimeFigureOut">
               <a:rPr lang="en-US" smtClean="0"/>
-              <a:t>4/30/2025</a:t>
+              <a:t>5/15/2025</a:t>
             </a:fld>
             <a:endParaRPr lang="en-US"/>
           </a:p>
@@ -863,7 +863,7 @@
           <a:p>
             <a:fld id="{75971C63-3134-492E-9112-1D5D7F800776}" type="datetimeFigureOut">
               <a:rPr lang="en-US" smtClean="0"/>
-              <a:t>4/30/2025</a:t>
+              <a:t>5/15/2025</a:t>
             </a:fld>
             <a:endParaRPr lang="en-US"/>
           </a:p>
@@ -1138,7 +1138,7 @@
           <a:p>
             <a:fld id="{75971C63-3134-492E-9112-1D5D7F800776}" type="datetimeFigureOut">
               <a:rPr lang="en-US" smtClean="0"/>
-              <a:t>4/30/2025</a:t>
+              <a:t>5/15/2025</a:t>
             </a:fld>
             <a:endParaRPr lang="en-US"/>
           </a:p>
@@ -1403,7 +1403,7 @@
           <a:p>
             <a:fld id="{75971C63-3134-492E-9112-1D5D7F800776}" type="datetimeFigureOut">
               <a:rPr lang="en-US" smtClean="0"/>
-              <a:t>4/30/2025</a:t>
+              <a:t>5/15/2025</a:t>
             </a:fld>
             <a:endParaRPr lang="en-US"/>
           </a:p>
@@ -1815,7 +1815,7 @@
           <a:p>
             <a:fld id="{75971C63-3134-492E-9112-1D5D7F800776}" type="datetimeFigureOut">
               <a:rPr lang="en-US" smtClean="0"/>
-              <a:t>4/30/2025</a:t>
+              <a:t>5/15/2025</a:t>
             </a:fld>
             <a:endParaRPr lang="en-US"/>
           </a:p>
@@ -1956,7 +1956,7 @@
           <a:p>
             <a:fld id="{75971C63-3134-492E-9112-1D5D7F800776}" type="datetimeFigureOut">
               <a:rPr lang="en-US" smtClean="0"/>
-              <a:t>4/30/2025</a:t>
+              <a:t>5/15/2025</a:t>
             </a:fld>
             <a:endParaRPr lang="en-US"/>
           </a:p>
@@ -2069,7 +2069,7 @@
           <a:p>
             <a:fld id="{75971C63-3134-492E-9112-1D5D7F800776}" type="datetimeFigureOut">
               <a:rPr lang="en-US" smtClean="0"/>
-              <a:t>4/30/2025</a:t>
+              <a:t>5/15/2025</a:t>
             </a:fld>
             <a:endParaRPr lang="en-US"/>
           </a:p>
@@ -2380,7 +2380,7 @@
           <a:p>
             <a:fld id="{75971C63-3134-492E-9112-1D5D7F800776}" type="datetimeFigureOut">
               <a:rPr lang="en-US" smtClean="0"/>
-              <a:t>4/30/2025</a:t>
+              <a:t>5/15/2025</a:t>
             </a:fld>
             <a:endParaRPr lang="en-US"/>
           </a:p>
@@ -2668,7 +2668,7 @@
           <a:p>
             <a:fld id="{75971C63-3134-492E-9112-1D5D7F800776}" type="datetimeFigureOut">
               <a:rPr lang="en-US" smtClean="0"/>
-              <a:t>4/30/2025</a:t>
+              <a:t>5/15/2025</a:t>
             </a:fld>
             <a:endParaRPr lang="en-US"/>
           </a:p>
@@ -2909,7 +2909,7 @@
           <a:p>
             <a:fld id="{75971C63-3134-492E-9112-1D5D7F800776}" type="datetimeFigureOut">
               <a:rPr lang="en-US" smtClean="0"/>
-              <a:t>4/30/2025</a:t>
+              <a:t>5/15/2025</a:t>
             </a:fld>
             <a:endParaRPr lang="en-US"/>
           </a:p>
@@ -3328,182 +3328,25 @@
       </p:grpSpPr>
       <p:sp>
         <p:nvSpPr>
-          <p:cNvPr id="4" name="TextBox 3">
-            <a:extLst>
-              <a:ext uri="{FF2B5EF4-FFF2-40B4-BE49-F238E27FC236}">
-                <a16:creationId xmlns:a16="http://schemas.microsoft.com/office/drawing/2014/main" id="{9E27D83B-2EF4-6C4C-91B3-46B216B982D7}"/>
-              </a:ext>
-            </a:extLst>
-          </p:cNvPr>
-          <p:cNvSpPr txBox="1"/>
+          <p:cNvPr id="39" name="Rectangle 38">
+            <a:extLst>
+              <a:ext uri="{FF2B5EF4-FFF2-40B4-BE49-F238E27FC236}">
+                <a16:creationId xmlns:a16="http://schemas.microsoft.com/office/drawing/2014/main" id="{058A1551-049B-4770-F61B-27047ECCC577}"/>
+              </a:ext>
+            </a:extLst>
+          </p:cNvPr>
+          <p:cNvSpPr/>
           <p:nvPr/>
         </p:nvSpPr>
         <p:spPr>
           <a:xfrm>
-            <a:off x="0" y="0"/>
-            <a:ext cx="4942443" cy="369332"/>
+            <a:off x="5533534" y="24402"/>
+            <a:ext cx="5754856" cy="683978"/>
           </a:xfrm>
           <a:prstGeom prst="rect">
             <a:avLst/>
           </a:prstGeom>
           <a:noFill/>
-          <a:ln>
-            <a:solidFill>
-              <a:schemeClr val="tx1"/>
-            </a:solidFill>
-          </a:ln>
-        </p:spPr>
-        <p:txBody>
-          <a:bodyPr wrap="none" rtlCol="0">
-            <a:spAutoFit/>
-          </a:bodyPr>
-          <a:lstStyle/>
-          <a:p>
-            <a:r>
-              <a:rPr lang="en-US" dirty="0"/>
-              <a:t>Map of code base for </a:t>
-            </a:r>
-            <a:r>
-              <a:rPr lang="en-US" dirty="0" err="1"/>
-              <a:t>COSPAL_timecourse</a:t>
-            </a:r>
-            <a:r>
-              <a:rPr lang="en-US" dirty="0"/>
-              <a:t> study</a:t>
-            </a:r>
-          </a:p>
-        </p:txBody>
-      </p:sp>
-      <p:sp>
-        <p:nvSpPr>
-          <p:cNvPr id="5" name="TextBox 4">
-            <a:extLst>
-              <a:ext uri="{FF2B5EF4-FFF2-40B4-BE49-F238E27FC236}">
-                <a16:creationId xmlns:a16="http://schemas.microsoft.com/office/drawing/2014/main" id="{3B8E6C6E-3BB6-1303-9DDD-ACFF93ACC86C}"/>
-              </a:ext>
-            </a:extLst>
-          </p:cNvPr>
-          <p:cNvSpPr txBox="1"/>
-          <p:nvPr/>
-        </p:nvSpPr>
-        <p:spPr>
-          <a:xfrm>
-            <a:off x="4818515" y="1121826"/>
-            <a:ext cx="1827744" cy="246221"/>
-          </a:xfrm>
-          <a:prstGeom prst="rect">
-            <a:avLst/>
-          </a:prstGeom>
-          <a:noFill/>
-          <a:ln>
-            <a:solidFill>
-              <a:schemeClr val="tx1"/>
-            </a:solidFill>
-          </a:ln>
-        </p:spPr>
-        <p:txBody>
-          <a:bodyPr wrap="none" rtlCol="0">
-            <a:spAutoFit/>
-          </a:bodyPr>
-          <a:lstStyle/>
-          <a:p>
-            <a:r>
-              <a:rPr lang="en-US" sz="1000" dirty="0" err="1"/>
-              <a:t>convert_fir_data_for_MVPA.m</a:t>
-            </a:r>
-            <a:endParaRPr lang="en-US" sz="1000" dirty="0"/>
-          </a:p>
-        </p:txBody>
-      </p:sp>
-      <p:sp>
-        <p:nvSpPr>
-          <p:cNvPr id="6" name="TextBox 5">
-            <a:extLst>
-              <a:ext uri="{FF2B5EF4-FFF2-40B4-BE49-F238E27FC236}">
-                <a16:creationId xmlns:a16="http://schemas.microsoft.com/office/drawing/2014/main" id="{D22999FF-CF3B-5899-C78B-818319F023C0}"/>
-              </a:ext>
-            </a:extLst>
-          </p:cNvPr>
-          <p:cNvSpPr txBox="1"/>
-          <p:nvPr/>
-        </p:nvSpPr>
-        <p:spPr>
-          <a:xfrm>
-            <a:off x="4705273" y="1480209"/>
-            <a:ext cx="2448087" cy="1015663"/>
-          </a:xfrm>
-          <a:prstGeom prst="rect">
-            <a:avLst/>
-          </a:prstGeom>
-          <a:noFill/>
-        </p:spPr>
-        <p:txBody>
-          <a:bodyPr wrap="square" rtlCol="0">
-            <a:spAutoFit/>
-          </a:bodyPr>
-          <a:lstStyle/>
-          <a:p>
-            <a:r>
-              <a:rPr lang="en-US" sz="1000" i="1" dirty="0"/>
-              <a:t>Takes </a:t>
-            </a:r>
-            <a:r>
-              <a:rPr lang="en-US" sz="1000" i="1" dirty="0" err="1"/>
-              <a:t>indiv_timecourses.mat</a:t>
-            </a:r>
-            <a:r>
-              <a:rPr lang="en-US" sz="1000" i="1" dirty="0"/>
-              <a:t> and </a:t>
-            </a:r>
-          </a:p>
-          <a:p>
-            <a:pPr marL="342900" indent="-342900">
-              <a:buAutoNum type="arabicParenR"/>
-            </a:pPr>
-            <a:r>
-              <a:rPr lang="en-US" sz="1000" i="1" dirty="0"/>
-              <a:t>reformats them into a feature set MVPA can use</a:t>
-            </a:r>
-          </a:p>
-          <a:p>
-            <a:pPr marL="342900" indent="-342900">
-              <a:buAutoNum type="arabicParenR"/>
-            </a:pPr>
-            <a:r>
-              <a:rPr lang="en-US" sz="1000" i="1" dirty="0"/>
-              <a:t>Creates a new “model file” corresponding to those patterns for MVPA to use</a:t>
-            </a:r>
-          </a:p>
-        </p:txBody>
-      </p:sp>
-      <p:sp>
-        <p:nvSpPr>
-          <p:cNvPr id="7" name="Arrow: Right 6">
-            <a:extLst>
-              <a:ext uri="{FF2B5EF4-FFF2-40B4-BE49-F238E27FC236}">
-                <a16:creationId xmlns:a16="http://schemas.microsoft.com/office/drawing/2014/main" id="{EE9C6E2D-8417-D77B-6F99-B3AD0844DAC8}"/>
-              </a:ext>
-            </a:extLst>
-          </p:cNvPr>
-          <p:cNvSpPr/>
-          <p:nvPr/>
-        </p:nvSpPr>
-        <p:spPr>
-          <a:xfrm>
-            <a:off x="6926783" y="1055606"/>
-            <a:ext cx="226577" cy="132439"/>
-          </a:xfrm>
-          <a:prstGeom prst="rightArrow">
-            <a:avLst/>
-          </a:prstGeom>
-          <a:solidFill>
-            <a:schemeClr val="tx1"/>
-          </a:solidFill>
-          <a:ln>
-            <a:solidFill>
-              <a:schemeClr val="tx1"/>
-            </a:solidFill>
-          </a:ln>
         </p:spPr>
         <p:style>
           <a:lnRef idx="2">
@@ -3532,10 +3375,10 @@
       </p:sp>
       <p:sp>
         <p:nvSpPr>
-          <p:cNvPr id="8" name="TextBox 7">
-            <a:extLst>
-              <a:ext uri="{FF2B5EF4-FFF2-40B4-BE49-F238E27FC236}">
-                <a16:creationId xmlns:a16="http://schemas.microsoft.com/office/drawing/2014/main" id="{FBD50286-66EB-E331-BCF5-AB310B541ACE}"/>
+          <p:cNvPr id="4" name="TextBox 3">
+            <a:extLst>
+              <a:ext uri="{FF2B5EF4-FFF2-40B4-BE49-F238E27FC236}">
+                <a16:creationId xmlns:a16="http://schemas.microsoft.com/office/drawing/2014/main" id="{9E27D83B-2EF4-6C4C-91B3-46B216B982D7}"/>
               </a:ext>
             </a:extLst>
           </p:cNvPr>
@@ -3544,17 +3387,13 @@
         </p:nvSpPr>
         <p:spPr>
           <a:xfrm>
-            <a:off x="7309513" y="998715"/>
-            <a:ext cx="1064715" cy="246221"/>
+            <a:off x="0" y="0"/>
+            <a:ext cx="4871718" cy="369332"/>
           </a:xfrm>
           <a:prstGeom prst="rect">
             <a:avLst/>
           </a:prstGeom>
-          <a:solidFill>
-            <a:schemeClr val="bg1">
-              <a:lumMod val="85000"/>
-            </a:schemeClr>
-          </a:solidFill>
+          <a:noFill/>
           <a:ln>
             <a:solidFill>
               <a:schemeClr val="tx1"/>
@@ -3568,18 +3407,128 @@
           <a:lstStyle/>
           <a:p>
             <a:r>
-              <a:rPr lang="en-US" sz="1000" dirty="0"/>
-              <a:t>FeatSet_01.mat</a:t>
-            </a:r>
-          </a:p>
-        </p:txBody>
-      </p:sp>
-      <p:sp>
-        <p:nvSpPr>
-          <p:cNvPr id="9" name="Arrow: Right 8">
-            <a:extLst>
-              <a:ext uri="{FF2B5EF4-FFF2-40B4-BE49-F238E27FC236}">
-                <a16:creationId xmlns:a16="http://schemas.microsoft.com/office/drawing/2014/main" id="{BC150717-9968-3C05-7704-82A6FD387E25}"/>
+              <a:rPr lang="en-US" dirty="0"/>
+              <a:t>Map of code base for </a:t>
+            </a:r>
+            <a:r>
+              <a:rPr lang="en-US" dirty="0" err="1"/>
+              <a:t>OLNOLTimecourse</a:t>
+            </a:r>
+            <a:r>
+              <a:rPr lang="en-US" dirty="0"/>
+              <a:t> study</a:t>
+            </a:r>
+          </a:p>
+        </p:txBody>
+      </p:sp>
+      <p:sp>
+        <p:nvSpPr>
+          <p:cNvPr id="5" name="TextBox 4">
+            <a:extLst>
+              <a:ext uri="{FF2B5EF4-FFF2-40B4-BE49-F238E27FC236}">
+                <a16:creationId xmlns:a16="http://schemas.microsoft.com/office/drawing/2014/main" id="{3B8E6C6E-3BB6-1303-9DDD-ACFF93ACC86C}"/>
+              </a:ext>
+            </a:extLst>
+          </p:cNvPr>
+          <p:cNvSpPr txBox="1"/>
+          <p:nvPr/>
+        </p:nvSpPr>
+        <p:spPr>
+          <a:xfrm>
+            <a:off x="4818515" y="1121826"/>
+            <a:ext cx="1827744" cy="246221"/>
+          </a:xfrm>
+          <a:prstGeom prst="rect">
+            <a:avLst/>
+          </a:prstGeom>
+          <a:noFill/>
+          <a:ln>
+            <a:solidFill>
+              <a:schemeClr val="tx1"/>
+            </a:solidFill>
+          </a:ln>
+        </p:spPr>
+        <p:txBody>
+          <a:bodyPr wrap="none" rtlCol="0">
+            <a:spAutoFit/>
+          </a:bodyPr>
+          <a:lstStyle/>
+          <a:p>
+            <a:r>
+              <a:rPr lang="en-US" sz="1000" dirty="0" err="1"/>
+              <a:t>convert_fir_data_for_MVPA.m</a:t>
+            </a:r>
+            <a:endParaRPr lang="en-US" sz="1000" dirty="0"/>
+          </a:p>
+        </p:txBody>
+      </p:sp>
+      <p:sp>
+        <p:nvSpPr>
+          <p:cNvPr id="6" name="TextBox 5">
+            <a:extLst>
+              <a:ext uri="{FF2B5EF4-FFF2-40B4-BE49-F238E27FC236}">
+                <a16:creationId xmlns:a16="http://schemas.microsoft.com/office/drawing/2014/main" id="{D22999FF-CF3B-5899-C78B-818319F023C0}"/>
+              </a:ext>
+            </a:extLst>
+          </p:cNvPr>
+          <p:cNvSpPr txBox="1"/>
+          <p:nvPr/>
+        </p:nvSpPr>
+        <p:spPr>
+          <a:xfrm>
+            <a:off x="4705273" y="1480209"/>
+            <a:ext cx="2448087" cy="1015663"/>
+          </a:xfrm>
+          <a:prstGeom prst="rect">
+            <a:avLst/>
+          </a:prstGeom>
+          <a:noFill/>
+        </p:spPr>
+        <p:txBody>
+          <a:bodyPr wrap="square" rtlCol="0">
+            <a:spAutoFit/>
+          </a:bodyPr>
+          <a:lstStyle/>
+          <a:p>
+            <a:r>
+              <a:rPr lang="en-US" sz="1000" i="1" dirty="0"/>
+              <a:t>Takes </a:t>
+            </a:r>
+            <a:r>
+              <a:rPr lang="en-US" sz="1000" i="1" dirty="0" err="1"/>
+              <a:t>indiv_timecourses.mat</a:t>
+            </a:r>
+            <a:r>
+              <a:rPr lang="en-US" sz="1000" i="1" dirty="0"/>
+              <a:t> and </a:t>
+            </a:r>
+          </a:p>
+          <a:p>
+            <a:pPr marL="342900" indent="-342900">
+              <a:buAutoNum type="arabicParenR"/>
+            </a:pPr>
+            <a:r>
+              <a:rPr lang="en-US" sz="1000" i="1" dirty="0"/>
+              <a:t>reformats them into a feature set MVPA can use</a:t>
+            </a:r>
+          </a:p>
+          <a:p>
+            <a:pPr marL="342900" indent="-342900">
+              <a:buAutoNum type="arabicParenR"/>
+            </a:pPr>
+            <a:r>
+              <a:rPr lang="en-US" sz="1000" i="1" dirty="0"/>
+              <a:t>Creates a new “model file” corresponding to those patterns for MVPA to use</a:t>
+            </a:r>
+          </a:p>
+        </p:txBody>
+      </p:sp>
+      <p:sp>
+        <p:nvSpPr>
+          <p:cNvPr id="7" name="Arrow: Right 6">
+            <a:extLst>
+              <a:ext uri="{FF2B5EF4-FFF2-40B4-BE49-F238E27FC236}">
+                <a16:creationId xmlns:a16="http://schemas.microsoft.com/office/drawing/2014/main" id="{EE9C6E2D-8417-D77B-6F99-B3AD0844DAC8}"/>
               </a:ext>
             </a:extLst>
           </p:cNvPr>
@@ -3588,7 +3537,7 @@
         </p:nvSpPr>
         <p:spPr>
           <a:xfrm>
-            <a:off x="6926783" y="1413989"/>
+            <a:off x="6926783" y="1055606"/>
             <a:ext cx="226577" cy="132439"/>
           </a:xfrm>
           <a:prstGeom prst="rightArrow">
@@ -3630,10 +3579,10 @@
       </p:sp>
       <p:sp>
         <p:nvSpPr>
-          <p:cNvPr id="10" name="TextBox 9">
-            <a:extLst>
-              <a:ext uri="{FF2B5EF4-FFF2-40B4-BE49-F238E27FC236}">
-                <a16:creationId xmlns:a16="http://schemas.microsoft.com/office/drawing/2014/main" id="{8FF0FA89-568E-D9F5-0D24-E043AAA4C9A7}"/>
+          <p:cNvPr id="8" name="TextBox 7">
+            <a:extLst>
+              <a:ext uri="{FF2B5EF4-FFF2-40B4-BE49-F238E27FC236}">
+                <a16:creationId xmlns:a16="http://schemas.microsoft.com/office/drawing/2014/main" id="{FBD50286-66EB-E331-BCF5-AB310B541ACE}"/>
               </a:ext>
             </a:extLst>
           </p:cNvPr>
@@ -3642,8 +3591,8 @@
         </p:nvSpPr>
         <p:spPr>
           <a:xfrm>
-            <a:off x="7309512" y="1365437"/>
-            <a:ext cx="1672253" cy="246221"/>
+            <a:off x="7309513" y="998715"/>
+            <a:ext cx="1064715" cy="246221"/>
           </a:xfrm>
           <a:prstGeom prst="rect">
             <a:avLst/>
@@ -3667,103 +3616,17 @@
           <a:p>
             <a:r>
               <a:rPr lang="en-US" sz="1000" dirty="0"/>
-              <a:t>FeatSet_01_namesfile.mat</a:t>
-            </a:r>
-          </a:p>
-        </p:txBody>
-      </p:sp>
-      <p:sp>
-        <p:nvSpPr>
-          <p:cNvPr id="11" name="TextBox 10">
-            <a:extLst>
-              <a:ext uri="{FF2B5EF4-FFF2-40B4-BE49-F238E27FC236}">
-                <a16:creationId xmlns:a16="http://schemas.microsoft.com/office/drawing/2014/main" id="{F933DB6F-7DDC-BD2C-1808-71576E8302BA}"/>
-              </a:ext>
-            </a:extLst>
-          </p:cNvPr>
-          <p:cNvSpPr txBox="1"/>
-          <p:nvPr/>
-        </p:nvSpPr>
-        <p:spPr>
-          <a:xfrm>
-            <a:off x="8530381" y="905077"/>
-            <a:ext cx="2758009" cy="400110"/>
-          </a:xfrm>
-          <a:prstGeom prst="rect">
-            <a:avLst/>
-          </a:prstGeom>
-          <a:noFill/>
-        </p:spPr>
-        <p:txBody>
-          <a:bodyPr wrap="square" rtlCol="0">
-            <a:spAutoFit/>
-          </a:bodyPr>
-          <a:lstStyle/>
-          <a:p>
-            <a:r>
-              <a:rPr lang="en-US" sz="1000" i="1" dirty="0"/>
-              <a:t>The </a:t>
-            </a:r>
-            <a:r>
-              <a:rPr lang="en-US" sz="1000" i="1" dirty="0" err="1"/>
-              <a:t>dataframe</a:t>
-            </a:r>
-            <a:r>
-              <a:rPr lang="en-US" sz="1000" i="1" dirty="0"/>
-              <a:t> or “feature set” that MVPA uses: all </a:t>
-            </a:r>
-            <a:r>
-              <a:rPr lang="en-US" sz="1000" i="1" dirty="0" err="1"/>
-              <a:t>timecourses</a:t>
-            </a:r>
-            <a:r>
-              <a:rPr lang="en-US" sz="1000" i="1" dirty="0"/>
-              <a:t> for all subjects in one matrix</a:t>
-            </a:r>
-          </a:p>
-        </p:txBody>
-      </p:sp>
-      <p:sp>
-        <p:nvSpPr>
-          <p:cNvPr id="12" name="TextBox 11">
-            <a:extLst>
-              <a:ext uri="{FF2B5EF4-FFF2-40B4-BE49-F238E27FC236}">
-                <a16:creationId xmlns:a16="http://schemas.microsoft.com/office/drawing/2014/main" id="{13F902EA-39E2-BA5C-2277-2C9A44801275}"/>
-              </a:ext>
-            </a:extLst>
-          </p:cNvPr>
-          <p:cNvSpPr txBox="1"/>
-          <p:nvPr/>
-        </p:nvSpPr>
-        <p:spPr>
-          <a:xfrm>
-            <a:off x="8981765" y="1288492"/>
-            <a:ext cx="2758009" cy="1323439"/>
-          </a:xfrm>
-          <a:prstGeom prst="rect">
-            <a:avLst/>
-          </a:prstGeom>
-          <a:noFill/>
-        </p:spPr>
-        <p:txBody>
-          <a:bodyPr wrap="square" rtlCol="0">
-            <a:spAutoFit/>
-          </a:bodyPr>
-          <a:lstStyle/>
-          <a:p>
-            <a:r>
-              <a:rPr lang="en-US" sz="1000" i="1" dirty="0"/>
-              <a:t>The “model file” for the “feature set”. Note, this is different from the individual subject model file we used for FIR estimation, but it’s technically the same TYPE of file – SPM (and MVPA) use this to assign condition names to patterns with different “onsets” (here not actually “time” but just a numerical index for each pattern</a:t>
-            </a:r>
-          </a:p>
-        </p:txBody>
-      </p:sp>
-      <p:sp>
-        <p:nvSpPr>
-          <p:cNvPr id="13" name="Arrow: Right 12">
-            <a:extLst>
-              <a:ext uri="{FF2B5EF4-FFF2-40B4-BE49-F238E27FC236}">
-                <a16:creationId xmlns:a16="http://schemas.microsoft.com/office/drawing/2014/main" id="{A9AAC233-DC4E-B9AA-10BC-5316B21A8521}"/>
+              <a:t>FeatSet_01.mat</a:t>
+            </a:r>
+          </a:p>
+        </p:txBody>
+      </p:sp>
+      <p:sp>
+        <p:nvSpPr>
+          <p:cNvPr id="9" name="Arrow: Right 8">
+            <a:extLst>
+              <a:ext uri="{FF2B5EF4-FFF2-40B4-BE49-F238E27FC236}">
+                <a16:creationId xmlns:a16="http://schemas.microsoft.com/office/drawing/2014/main" id="{BC150717-9968-3C05-7704-82A6FD387E25}"/>
               </a:ext>
             </a:extLst>
           </p:cNvPr>
@@ -3771,9 +3634,9 @@
           <p:nvPr/>
         </p:nvSpPr>
         <p:spPr>
-          <a:xfrm rot="5400000">
-            <a:off x="7181297" y="2580139"/>
-            <a:ext cx="1509434" cy="188288"/>
+          <a:xfrm>
+            <a:off x="6926783" y="1413989"/>
+            <a:ext cx="226577" cy="132439"/>
           </a:xfrm>
           <a:prstGeom prst="rightArrow">
             <a:avLst/>
@@ -3814,10 +3677,10 @@
       </p:sp>
       <p:sp>
         <p:nvSpPr>
-          <p:cNvPr id="14" name="TextBox 13">
-            <a:extLst>
-              <a:ext uri="{FF2B5EF4-FFF2-40B4-BE49-F238E27FC236}">
-                <a16:creationId xmlns:a16="http://schemas.microsoft.com/office/drawing/2014/main" id="{EC067D4A-2B28-7BAE-16AE-8B121C06BE5C}"/>
+          <p:cNvPr id="10" name="TextBox 9">
+            <a:extLst>
+              <a:ext uri="{FF2B5EF4-FFF2-40B4-BE49-F238E27FC236}">
+                <a16:creationId xmlns:a16="http://schemas.microsoft.com/office/drawing/2014/main" id="{8FF0FA89-568E-D9F5-0D24-E043AAA4C9A7}"/>
               </a:ext>
             </a:extLst>
           </p:cNvPr>
@@ -3826,8 +3689,52 @@
         </p:nvSpPr>
         <p:spPr>
           <a:xfrm>
-            <a:off x="6004475" y="3538142"/>
-            <a:ext cx="4282326" cy="369332"/>
+            <a:off x="7309512" y="1365437"/>
+            <a:ext cx="1672253" cy="246221"/>
+          </a:xfrm>
+          <a:prstGeom prst="rect">
+            <a:avLst/>
+          </a:prstGeom>
+          <a:solidFill>
+            <a:schemeClr val="bg1">
+              <a:lumMod val="85000"/>
+            </a:schemeClr>
+          </a:solidFill>
+          <a:ln>
+            <a:solidFill>
+              <a:schemeClr val="tx1"/>
+            </a:solidFill>
+          </a:ln>
+        </p:spPr>
+        <p:txBody>
+          <a:bodyPr wrap="none" rtlCol="0">
+            <a:spAutoFit/>
+          </a:bodyPr>
+          <a:lstStyle/>
+          <a:p>
+            <a:r>
+              <a:rPr lang="en-US" sz="1000" dirty="0"/>
+              <a:t>FeatSet_01_namesfile.mat</a:t>
+            </a:r>
+          </a:p>
+        </p:txBody>
+      </p:sp>
+      <p:sp>
+        <p:nvSpPr>
+          <p:cNvPr id="11" name="TextBox 10">
+            <a:extLst>
+              <a:ext uri="{FF2B5EF4-FFF2-40B4-BE49-F238E27FC236}">
+                <a16:creationId xmlns:a16="http://schemas.microsoft.com/office/drawing/2014/main" id="{F933DB6F-7DDC-BD2C-1808-71576E8302BA}"/>
+              </a:ext>
+            </a:extLst>
+          </p:cNvPr>
+          <p:cNvSpPr txBox="1"/>
+          <p:nvPr/>
+        </p:nvSpPr>
+        <p:spPr>
+          <a:xfrm>
+            <a:off x="8530381" y="905077"/>
+            <a:ext cx="2758009" cy="400110"/>
           </a:xfrm>
           <a:prstGeom prst="rect">
             <a:avLst/>
@@ -3835,6 +3742,146 @@
           <a:noFill/>
         </p:spPr>
         <p:txBody>
+          <a:bodyPr wrap="square" rtlCol="0">
+            <a:spAutoFit/>
+          </a:bodyPr>
+          <a:lstStyle/>
+          <a:p>
+            <a:r>
+              <a:rPr lang="en-US" sz="1000" i="1" dirty="0"/>
+              <a:t>The </a:t>
+            </a:r>
+            <a:r>
+              <a:rPr lang="en-US" sz="1000" i="1" dirty="0" err="1"/>
+              <a:t>dataframe</a:t>
+            </a:r>
+            <a:r>
+              <a:rPr lang="en-US" sz="1000" i="1" dirty="0"/>
+              <a:t> or “feature set” that MVPA uses: all </a:t>
+            </a:r>
+            <a:r>
+              <a:rPr lang="en-US" sz="1000" i="1" dirty="0" err="1"/>
+              <a:t>timecourses</a:t>
+            </a:r>
+            <a:r>
+              <a:rPr lang="en-US" sz="1000" i="1" dirty="0"/>
+              <a:t> for all subjects in one matrix</a:t>
+            </a:r>
+          </a:p>
+        </p:txBody>
+      </p:sp>
+      <p:sp>
+        <p:nvSpPr>
+          <p:cNvPr id="12" name="TextBox 11">
+            <a:extLst>
+              <a:ext uri="{FF2B5EF4-FFF2-40B4-BE49-F238E27FC236}">
+                <a16:creationId xmlns:a16="http://schemas.microsoft.com/office/drawing/2014/main" id="{13F902EA-39E2-BA5C-2277-2C9A44801275}"/>
+              </a:ext>
+            </a:extLst>
+          </p:cNvPr>
+          <p:cNvSpPr txBox="1"/>
+          <p:nvPr/>
+        </p:nvSpPr>
+        <p:spPr>
+          <a:xfrm>
+            <a:off x="8981765" y="1288492"/>
+            <a:ext cx="2758009" cy="1323439"/>
+          </a:xfrm>
+          <a:prstGeom prst="rect">
+            <a:avLst/>
+          </a:prstGeom>
+          <a:noFill/>
+        </p:spPr>
+        <p:txBody>
+          <a:bodyPr wrap="square" rtlCol="0">
+            <a:spAutoFit/>
+          </a:bodyPr>
+          <a:lstStyle/>
+          <a:p>
+            <a:r>
+              <a:rPr lang="en-US" sz="1000" i="1" dirty="0"/>
+              <a:t>The “model file” for the “feature set”. Note, this is different from the individual subject model file we used for FIR estimation, but it’s technically the same TYPE of file – SPM (and MVPA) use this to assign condition names to patterns with different “onsets” (here not actually “time” but just a numerical index for each pattern</a:t>
+            </a:r>
+          </a:p>
+        </p:txBody>
+      </p:sp>
+      <p:sp>
+        <p:nvSpPr>
+          <p:cNvPr id="13" name="Arrow: Right 12">
+            <a:extLst>
+              <a:ext uri="{FF2B5EF4-FFF2-40B4-BE49-F238E27FC236}">
+                <a16:creationId xmlns:a16="http://schemas.microsoft.com/office/drawing/2014/main" id="{A9AAC233-DC4E-B9AA-10BC-5316B21A8521}"/>
+              </a:ext>
+            </a:extLst>
+          </p:cNvPr>
+          <p:cNvSpPr/>
+          <p:nvPr/>
+        </p:nvSpPr>
+        <p:spPr>
+          <a:xfrm rot="5400000">
+            <a:off x="7181297" y="2452918"/>
+            <a:ext cx="1509434" cy="188288"/>
+          </a:xfrm>
+          <a:prstGeom prst="rightArrow">
+            <a:avLst/>
+          </a:prstGeom>
+          <a:solidFill>
+            <a:schemeClr val="tx1"/>
+          </a:solidFill>
+          <a:ln>
+            <a:solidFill>
+              <a:schemeClr val="tx1"/>
+            </a:solidFill>
+          </a:ln>
+        </p:spPr>
+        <p:style>
+          <a:lnRef idx="2">
+            <a:schemeClr val="accent1">
+              <a:shade val="15000"/>
+            </a:schemeClr>
+          </a:lnRef>
+          <a:fillRef idx="1">
+            <a:schemeClr val="accent1"/>
+          </a:fillRef>
+          <a:effectRef idx="0">
+            <a:schemeClr val="accent1"/>
+          </a:effectRef>
+          <a:fontRef idx="minor">
+            <a:schemeClr val="lt1"/>
+          </a:fontRef>
+        </p:style>
+        <p:txBody>
+          <a:bodyPr rtlCol="0" anchor="ctr"/>
+          <a:lstStyle/>
+          <a:p>
+            <a:pPr algn="ctr"/>
+            <a:endParaRPr lang="en-US"/>
+          </a:p>
+        </p:txBody>
+      </p:sp>
+      <p:sp>
+        <p:nvSpPr>
+          <p:cNvPr id="14" name="TextBox 13">
+            <a:extLst>
+              <a:ext uri="{FF2B5EF4-FFF2-40B4-BE49-F238E27FC236}">
+                <a16:creationId xmlns:a16="http://schemas.microsoft.com/office/drawing/2014/main" id="{EC067D4A-2B28-7BAE-16AE-8B121C06BE5C}"/>
+              </a:ext>
+            </a:extLst>
+          </p:cNvPr>
+          <p:cNvSpPr txBox="1"/>
+          <p:nvPr/>
+        </p:nvSpPr>
+        <p:spPr>
+          <a:xfrm>
+            <a:off x="6004475" y="3275749"/>
+            <a:ext cx="4282326" cy="369332"/>
+          </a:xfrm>
+          <a:prstGeom prst="rect">
+            <a:avLst/>
+          </a:prstGeom>
+          <a:noFill/>
+        </p:spPr>
+        <p:txBody>
           <a:bodyPr wrap="none" rtlCol="0">
             <a:spAutoFit/>
           </a:bodyPr>
@@ -3861,7 +3908,7 @@
         </p:nvSpPr>
         <p:spPr>
           <a:xfrm>
-            <a:off x="7022142" y="4016997"/>
+            <a:off x="4706719" y="4245009"/>
             <a:ext cx="1604927" cy="246221"/>
           </a:xfrm>
           <a:prstGeom prst="rect">
@@ -3888,6 +3935,1676 @@
           </a:p>
         </p:txBody>
       </p:sp>
+      <p:sp>
+        <p:nvSpPr>
+          <p:cNvPr id="3" name="TextBox 2">
+            <a:extLst>
+              <a:ext uri="{FF2B5EF4-FFF2-40B4-BE49-F238E27FC236}">
+                <a16:creationId xmlns:a16="http://schemas.microsoft.com/office/drawing/2014/main" id="{65C0B2A6-1C9F-0603-A7DE-510F3C99B5E8}"/>
+              </a:ext>
+            </a:extLst>
+          </p:cNvPr>
+          <p:cNvSpPr txBox="1"/>
+          <p:nvPr/>
+        </p:nvSpPr>
+        <p:spPr>
+          <a:xfrm>
+            <a:off x="6653759" y="4245882"/>
+            <a:ext cx="2420856" cy="246221"/>
+          </a:xfrm>
+          <a:prstGeom prst="rect">
+            <a:avLst/>
+          </a:prstGeom>
+          <a:noFill/>
+          <a:ln>
+            <a:solidFill>
+              <a:schemeClr val="tx1"/>
+            </a:solidFill>
+          </a:ln>
+        </p:spPr>
+        <p:txBody>
+          <a:bodyPr wrap="none" rtlCol="0">
+            <a:spAutoFit/>
+          </a:bodyPr>
+          <a:lstStyle/>
+          <a:p>
+            <a:r>
+              <a:rPr lang="en-US" sz="1000" dirty="0" err="1"/>
+              <a:t>generate_conditionlabels_forpatterns.m</a:t>
+            </a:r>
+            <a:endParaRPr lang="en-US" sz="1000" dirty="0"/>
+          </a:p>
+        </p:txBody>
+      </p:sp>
+      <p:sp>
+        <p:nvSpPr>
+          <p:cNvPr id="15" name="TextBox 14">
+            <a:extLst>
+              <a:ext uri="{FF2B5EF4-FFF2-40B4-BE49-F238E27FC236}">
+                <a16:creationId xmlns:a16="http://schemas.microsoft.com/office/drawing/2014/main" id="{0610FDF8-B833-37FD-CA50-DB0FE3CC990C}"/>
+              </a:ext>
+            </a:extLst>
+          </p:cNvPr>
+          <p:cNvSpPr txBox="1"/>
+          <p:nvPr/>
+        </p:nvSpPr>
+        <p:spPr>
+          <a:xfrm>
+            <a:off x="9146983" y="4245881"/>
+            <a:ext cx="2775119" cy="246221"/>
+          </a:xfrm>
+          <a:prstGeom prst="rect">
+            <a:avLst/>
+          </a:prstGeom>
+          <a:noFill/>
+          <a:ln>
+            <a:solidFill>
+              <a:schemeClr val="tx1"/>
+            </a:solidFill>
+          </a:ln>
+        </p:spPr>
+        <p:txBody>
+          <a:bodyPr wrap="none" rtlCol="0">
+            <a:spAutoFit/>
+          </a:bodyPr>
+          <a:lstStyle/>
+          <a:p>
+            <a:r>
+              <a:rPr lang="en-US" sz="1000" dirty="0" err="1"/>
+              <a:t>mvpa_params_general_OLNOLTimecourses.m</a:t>
+            </a:r>
+            <a:endParaRPr lang="en-US" sz="1000" dirty="0"/>
+          </a:p>
+        </p:txBody>
+      </p:sp>
+      <p:sp>
+        <p:nvSpPr>
+          <p:cNvPr id="16" name="TextBox 15">
+            <a:extLst>
+              <a:ext uri="{FF2B5EF4-FFF2-40B4-BE49-F238E27FC236}">
+                <a16:creationId xmlns:a16="http://schemas.microsoft.com/office/drawing/2014/main" id="{ADCDD93B-D706-C012-EFC5-6FCF6159B8CF}"/>
+              </a:ext>
+            </a:extLst>
+          </p:cNvPr>
+          <p:cNvSpPr txBox="1"/>
+          <p:nvPr/>
+        </p:nvSpPr>
+        <p:spPr>
+          <a:xfrm>
+            <a:off x="7373122" y="3725863"/>
+            <a:ext cx="4282326" cy="400110"/>
+          </a:xfrm>
+          <a:prstGeom prst="rect">
+            <a:avLst/>
+          </a:prstGeom>
+          <a:noFill/>
+        </p:spPr>
+        <p:txBody>
+          <a:bodyPr wrap="square" rtlCol="0">
+            <a:spAutoFit/>
+          </a:bodyPr>
+          <a:lstStyle/>
+          <a:p>
+            <a:r>
+              <a:rPr lang="en-US" sz="1000" b="1" i="1" dirty="0"/>
+              <a:t>Located in </a:t>
+            </a:r>
+            <a:r>
+              <a:rPr lang="en-US" sz="1000" b="1" i="1" dirty="0" err="1"/>
+              <a:t>OLNOLTimecourses</a:t>
+            </a:r>
+            <a:r>
+              <a:rPr lang="en-US" sz="1000" b="1" i="1" dirty="0"/>
+              <a:t> </a:t>
+            </a:r>
+            <a:r>
+              <a:rPr lang="en-US" sz="1000" b="1" i="1" dirty="0" err="1"/>
+              <a:t>github</a:t>
+            </a:r>
+            <a:r>
+              <a:rPr lang="en-US" sz="1000" b="1" i="1" dirty="0"/>
+              <a:t> repo</a:t>
+            </a:r>
+            <a:r>
+              <a:rPr lang="en-US" sz="1000" i="1" dirty="0"/>
+              <a:t> under “</a:t>
+            </a:r>
+            <a:r>
+              <a:rPr lang="en-US" sz="1000" i="1" dirty="0" err="1"/>
+              <a:t>MVPA_helper_code</a:t>
+            </a:r>
+            <a:r>
+              <a:rPr lang="en-US" sz="1000" i="1" dirty="0"/>
+              <a:t>” folder. Both must be edited for your specific analysis</a:t>
+            </a:r>
+          </a:p>
+        </p:txBody>
+      </p:sp>
+      <p:sp>
+        <p:nvSpPr>
+          <p:cNvPr id="17" name="TextBox 16">
+            <a:extLst>
+              <a:ext uri="{FF2B5EF4-FFF2-40B4-BE49-F238E27FC236}">
+                <a16:creationId xmlns:a16="http://schemas.microsoft.com/office/drawing/2014/main" id="{F2536FA0-AAB0-EB34-4286-4ABF4C8245B6}"/>
+              </a:ext>
+            </a:extLst>
+          </p:cNvPr>
+          <p:cNvSpPr txBox="1"/>
+          <p:nvPr/>
+        </p:nvSpPr>
+        <p:spPr>
+          <a:xfrm>
+            <a:off x="3709909" y="3517307"/>
+            <a:ext cx="3352754" cy="707886"/>
+          </a:xfrm>
+          <a:prstGeom prst="rect">
+            <a:avLst/>
+          </a:prstGeom>
+          <a:noFill/>
+        </p:spPr>
+        <p:txBody>
+          <a:bodyPr wrap="square" rtlCol="0">
+            <a:spAutoFit/>
+          </a:bodyPr>
+          <a:lstStyle/>
+          <a:p>
+            <a:r>
+              <a:rPr lang="en-US" sz="1000" b="1" i="1" dirty="0"/>
+              <a:t>Located in </a:t>
+            </a:r>
+            <a:r>
+              <a:rPr lang="en-US" sz="1000" b="1" i="1" dirty="0" err="1"/>
+              <a:t>plMVPALite</a:t>
+            </a:r>
+            <a:r>
+              <a:rPr lang="en-US" sz="1000" b="1" i="1" dirty="0"/>
+              <a:t> </a:t>
+            </a:r>
+            <a:r>
+              <a:rPr lang="en-US" sz="1000" b="1" i="1" dirty="0" err="1"/>
+              <a:t>github</a:t>
+            </a:r>
+            <a:r>
+              <a:rPr lang="en-US" sz="1000" b="1" i="1" dirty="0"/>
+              <a:t> repo</a:t>
+            </a:r>
+            <a:r>
+              <a:rPr lang="en-US" sz="1000" i="1" dirty="0"/>
+              <a:t>. Should not need editing EXCEPT at top to call on </a:t>
+            </a:r>
+            <a:r>
+              <a:rPr lang="en-US" sz="1000" i="1" dirty="0" err="1"/>
+              <a:t>mvpa_params_general_OLNOLTimecourses.m</a:t>
+            </a:r>
+            <a:r>
+              <a:rPr lang="en-US" sz="1000" i="1" dirty="0"/>
+              <a:t> and not one of my other </a:t>
+            </a:r>
+            <a:r>
+              <a:rPr lang="en-US" sz="1000" i="1" dirty="0" err="1"/>
+              <a:t>mvpa_params</a:t>
+            </a:r>
+            <a:r>
+              <a:rPr lang="en-US" sz="1000" i="1" dirty="0"/>
+              <a:t>…m files in the repo</a:t>
+            </a:r>
+          </a:p>
+        </p:txBody>
+      </p:sp>
+      <p:sp>
+        <p:nvSpPr>
+          <p:cNvPr id="19" name="Left Brace 18">
+            <a:extLst>
+              <a:ext uri="{FF2B5EF4-FFF2-40B4-BE49-F238E27FC236}">
+                <a16:creationId xmlns:a16="http://schemas.microsoft.com/office/drawing/2014/main" id="{79AE5B4C-D154-B146-C494-E9BD82AA5CAD}"/>
+              </a:ext>
+            </a:extLst>
+          </p:cNvPr>
+          <p:cNvSpPr/>
+          <p:nvPr/>
+        </p:nvSpPr>
+        <p:spPr>
+          <a:xfrm rot="16200000">
+            <a:off x="7917739" y="2548717"/>
+            <a:ext cx="204587" cy="4331175"/>
+          </a:xfrm>
+          <a:prstGeom prst="leftBrace">
+            <a:avLst/>
+          </a:prstGeom>
+        </p:spPr>
+        <p:style>
+          <a:lnRef idx="2">
+            <a:schemeClr val="accent1"/>
+          </a:lnRef>
+          <a:fillRef idx="0">
+            <a:schemeClr val="accent1"/>
+          </a:fillRef>
+          <a:effectRef idx="1">
+            <a:schemeClr val="accent1"/>
+          </a:effectRef>
+          <a:fontRef idx="minor">
+            <a:schemeClr val="tx1"/>
+          </a:fontRef>
+        </p:style>
+        <p:txBody>
+          <a:bodyPr rtlCol="0" anchor="ctr"/>
+          <a:lstStyle/>
+          <a:p>
+            <a:pPr algn="ctr"/>
+            <a:endParaRPr lang="en-US"/>
+          </a:p>
+        </p:txBody>
+      </p:sp>
+      <p:cxnSp>
+        <p:nvCxnSpPr>
+          <p:cNvPr id="21" name="Straight Connector 20">
+            <a:extLst>
+              <a:ext uri="{FF2B5EF4-FFF2-40B4-BE49-F238E27FC236}">
+                <a16:creationId xmlns:a16="http://schemas.microsoft.com/office/drawing/2014/main" id="{797AB89C-E9FA-97AC-1C8E-0933CC514E4B}"/>
+              </a:ext>
+            </a:extLst>
+          </p:cNvPr>
+          <p:cNvCxnSpPr>
+            <a:cxnSpLocks/>
+          </p:cNvCxnSpPr>
+          <p:nvPr/>
+        </p:nvCxnSpPr>
+        <p:spPr>
+          <a:xfrm>
+            <a:off x="7800718" y="4125973"/>
+            <a:ext cx="2804437" cy="0"/>
+          </a:xfrm>
+          <a:prstGeom prst="line">
+            <a:avLst/>
+          </a:prstGeom>
+          <a:ln>
+            <a:headEnd type="diamond"/>
+            <a:tailEnd type="diamond"/>
+          </a:ln>
+        </p:spPr>
+        <p:style>
+          <a:lnRef idx="2">
+            <a:schemeClr val="accent1"/>
+          </a:lnRef>
+          <a:fillRef idx="0">
+            <a:schemeClr val="accent1"/>
+          </a:fillRef>
+          <a:effectRef idx="1">
+            <a:schemeClr val="accent1"/>
+          </a:effectRef>
+          <a:fontRef idx="minor">
+            <a:schemeClr val="tx1"/>
+          </a:fontRef>
+        </p:style>
+      </p:cxnSp>
+      <p:sp>
+        <p:nvSpPr>
+          <p:cNvPr id="24" name="TextBox 23">
+            <a:extLst>
+              <a:ext uri="{FF2B5EF4-FFF2-40B4-BE49-F238E27FC236}">
+                <a16:creationId xmlns:a16="http://schemas.microsoft.com/office/drawing/2014/main" id="{8882DF80-1FB5-6D77-D55B-901F0A719A9D}"/>
+              </a:ext>
+            </a:extLst>
+          </p:cNvPr>
+          <p:cNvSpPr txBox="1"/>
+          <p:nvPr/>
+        </p:nvSpPr>
+        <p:spPr>
+          <a:xfrm>
+            <a:off x="6926783" y="4933713"/>
+            <a:ext cx="2343911" cy="246221"/>
+          </a:xfrm>
+          <a:prstGeom prst="rect">
+            <a:avLst/>
+          </a:prstGeom>
+          <a:solidFill>
+            <a:schemeClr val="bg1">
+              <a:lumMod val="85000"/>
+            </a:schemeClr>
+          </a:solidFill>
+          <a:ln>
+            <a:solidFill>
+              <a:schemeClr val="tx1"/>
+            </a:solidFill>
+          </a:ln>
+        </p:spPr>
+        <p:txBody>
+          <a:bodyPr wrap="none" rtlCol="0">
+            <a:spAutoFit/>
+          </a:bodyPr>
+          <a:lstStyle/>
+          <a:p>
+            <a:r>
+              <a:rPr lang="en-US" sz="1000" dirty="0"/>
+              <a:t>8080test_2way_nf_ws1_Featset01.mat</a:t>
+            </a:r>
+          </a:p>
+        </p:txBody>
+      </p:sp>
+      <p:sp>
+        <p:nvSpPr>
+          <p:cNvPr id="25" name="TextBox 24">
+            <a:extLst>
+              <a:ext uri="{FF2B5EF4-FFF2-40B4-BE49-F238E27FC236}">
+                <a16:creationId xmlns:a16="http://schemas.microsoft.com/office/drawing/2014/main" id="{0372A4C8-9FAD-570A-C3A2-D041F46C10B9}"/>
+              </a:ext>
+            </a:extLst>
+          </p:cNvPr>
+          <p:cNvSpPr txBox="1"/>
+          <p:nvPr/>
+        </p:nvSpPr>
+        <p:spPr>
+          <a:xfrm>
+            <a:off x="9274097" y="4820404"/>
+            <a:ext cx="2758009" cy="553998"/>
+          </a:xfrm>
+          <a:prstGeom prst="rect">
+            <a:avLst/>
+          </a:prstGeom>
+          <a:noFill/>
+        </p:spPr>
+        <p:txBody>
+          <a:bodyPr wrap="square" rtlCol="0">
+            <a:spAutoFit/>
+          </a:bodyPr>
+          <a:lstStyle/>
+          <a:p>
+            <a:r>
+              <a:rPr lang="en-US" sz="1000" i="1" dirty="0"/>
+              <a:t>The “results” file contains a complex “res” variable: a structural array that contains all the MVPA performance data you want</a:t>
+            </a:r>
+          </a:p>
+        </p:txBody>
+      </p:sp>
+      <p:sp>
+        <p:nvSpPr>
+          <p:cNvPr id="26" name="TextBox 25">
+            <a:extLst>
+              <a:ext uri="{FF2B5EF4-FFF2-40B4-BE49-F238E27FC236}">
+                <a16:creationId xmlns:a16="http://schemas.microsoft.com/office/drawing/2014/main" id="{568587B5-B6F6-F5F5-F299-C1947A0F4CEF}"/>
+              </a:ext>
+            </a:extLst>
+          </p:cNvPr>
+          <p:cNvSpPr txBox="1"/>
+          <p:nvPr/>
+        </p:nvSpPr>
+        <p:spPr>
+          <a:xfrm>
+            <a:off x="6390043" y="5551656"/>
+            <a:ext cx="1345240" cy="246221"/>
+          </a:xfrm>
+          <a:prstGeom prst="rect">
+            <a:avLst/>
+          </a:prstGeom>
+          <a:noFill/>
+          <a:ln>
+            <a:solidFill>
+              <a:schemeClr val="tx1"/>
+            </a:solidFill>
+          </a:ln>
+        </p:spPr>
+        <p:txBody>
+          <a:bodyPr wrap="none" rtlCol="0">
+            <a:spAutoFit/>
+          </a:bodyPr>
+          <a:lstStyle/>
+          <a:p>
+            <a:r>
+              <a:rPr lang="en-US" sz="1000" dirty="0" err="1"/>
+              <a:t>plot_weights_map.m</a:t>
+            </a:r>
+            <a:endParaRPr lang="en-US" sz="1000" dirty="0"/>
+          </a:p>
+        </p:txBody>
+      </p:sp>
+      <p:sp>
+        <p:nvSpPr>
+          <p:cNvPr id="28" name="Arrow: Right 27">
+            <a:extLst>
+              <a:ext uri="{FF2B5EF4-FFF2-40B4-BE49-F238E27FC236}">
+                <a16:creationId xmlns:a16="http://schemas.microsoft.com/office/drawing/2014/main" id="{C938270B-E847-5763-1925-DCB715A7628E}"/>
+              </a:ext>
+            </a:extLst>
+          </p:cNvPr>
+          <p:cNvSpPr/>
+          <p:nvPr/>
+        </p:nvSpPr>
+        <p:spPr>
+          <a:xfrm rot="5400000">
+            <a:off x="7088551" y="5325657"/>
+            <a:ext cx="226577" cy="132439"/>
+          </a:xfrm>
+          <a:prstGeom prst="rightArrow">
+            <a:avLst/>
+          </a:prstGeom>
+          <a:solidFill>
+            <a:schemeClr val="tx1"/>
+          </a:solidFill>
+          <a:ln>
+            <a:solidFill>
+              <a:schemeClr val="tx1"/>
+            </a:solidFill>
+          </a:ln>
+        </p:spPr>
+        <p:style>
+          <a:lnRef idx="2">
+            <a:schemeClr val="accent1">
+              <a:shade val="15000"/>
+            </a:schemeClr>
+          </a:lnRef>
+          <a:fillRef idx="1">
+            <a:schemeClr val="accent1"/>
+          </a:fillRef>
+          <a:effectRef idx="0">
+            <a:schemeClr val="accent1"/>
+          </a:effectRef>
+          <a:fontRef idx="minor">
+            <a:schemeClr val="lt1"/>
+          </a:fontRef>
+        </p:style>
+        <p:txBody>
+          <a:bodyPr rtlCol="0" anchor="ctr"/>
+          <a:lstStyle/>
+          <a:p>
+            <a:pPr algn="ctr"/>
+            <a:endParaRPr lang="en-US"/>
+          </a:p>
+        </p:txBody>
+      </p:sp>
+      <p:sp>
+        <p:nvSpPr>
+          <p:cNvPr id="29" name="Arrow: Right 28">
+            <a:extLst>
+              <a:ext uri="{FF2B5EF4-FFF2-40B4-BE49-F238E27FC236}">
+                <a16:creationId xmlns:a16="http://schemas.microsoft.com/office/drawing/2014/main" id="{D43517DD-9A2B-A0F1-6AD3-4F20D7C18D9F}"/>
+              </a:ext>
+            </a:extLst>
+          </p:cNvPr>
+          <p:cNvSpPr/>
+          <p:nvPr/>
+        </p:nvSpPr>
+        <p:spPr>
+          <a:xfrm rot="5400000">
+            <a:off x="8912043" y="5325657"/>
+            <a:ext cx="226577" cy="132439"/>
+          </a:xfrm>
+          <a:prstGeom prst="rightArrow">
+            <a:avLst/>
+          </a:prstGeom>
+          <a:solidFill>
+            <a:schemeClr val="tx1"/>
+          </a:solidFill>
+          <a:ln>
+            <a:solidFill>
+              <a:schemeClr val="tx1"/>
+            </a:solidFill>
+          </a:ln>
+        </p:spPr>
+        <p:style>
+          <a:lnRef idx="2">
+            <a:schemeClr val="accent1">
+              <a:shade val="15000"/>
+            </a:schemeClr>
+          </a:lnRef>
+          <a:fillRef idx="1">
+            <a:schemeClr val="accent1"/>
+          </a:fillRef>
+          <a:effectRef idx="0">
+            <a:schemeClr val="accent1"/>
+          </a:effectRef>
+          <a:fontRef idx="minor">
+            <a:schemeClr val="lt1"/>
+          </a:fontRef>
+        </p:style>
+        <p:txBody>
+          <a:bodyPr rtlCol="0" anchor="ctr"/>
+          <a:lstStyle/>
+          <a:p>
+            <a:pPr algn="ctr"/>
+            <a:endParaRPr lang="en-US"/>
+          </a:p>
+        </p:txBody>
+      </p:sp>
+      <p:pic>
+        <p:nvPicPr>
+          <p:cNvPr id="31" name="Picture 30" descr="A graph of a number&#10;&#10;AI-generated content may be incorrect.">
+            <a:extLst>
+              <a:ext uri="{FF2B5EF4-FFF2-40B4-BE49-F238E27FC236}">
+                <a16:creationId xmlns:a16="http://schemas.microsoft.com/office/drawing/2014/main" id="{C5FDC8C4-01E3-8229-8145-EFA0A82C07BB}"/>
+              </a:ext>
+            </a:extLst>
+          </p:cNvPr>
+          <p:cNvPicPr>
+            <a:picLocks noChangeAspect="1"/>
+          </p:cNvPicPr>
+          <p:nvPr/>
+        </p:nvPicPr>
+        <p:blipFill>
+          <a:blip r:embed="rId2">
+            <a:extLst>
+              <a:ext uri="{28A0092B-C50C-407E-A947-70E740481C1C}">
+                <a14:useLocalDpi xmlns:a14="http://schemas.microsoft.com/office/drawing/2010/main" val="0"/>
+              </a:ext>
+            </a:extLst>
+          </a:blip>
+          <a:stretch>
+            <a:fillRect/>
+          </a:stretch>
+        </p:blipFill>
+        <p:spPr>
+          <a:xfrm>
+            <a:off x="6557317" y="5943273"/>
+            <a:ext cx="991838" cy="743879"/>
+          </a:xfrm>
+          <a:prstGeom prst="rect">
+            <a:avLst/>
+          </a:prstGeom>
+        </p:spPr>
+      </p:pic>
+      <p:sp>
+        <p:nvSpPr>
+          <p:cNvPr id="33" name="TextBox 32">
+            <a:extLst>
+              <a:ext uri="{FF2B5EF4-FFF2-40B4-BE49-F238E27FC236}">
+                <a16:creationId xmlns:a16="http://schemas.microsoft.com/office/drawing/2014/main" id="{F06FD2E2-84AF-AAE7-9C45-93DAAF6380F7}"/>
+              </a:ext>
+            </a:extLst>
+          </p:cNvPr>
+          <p:cNvSpPr txBox="1"/>
+          <p:nvPr/>
+        </p:nvSpPr>
+        <p:spPr>
+          <a:xfrm>
+            <a:off x="3981094" y="5551656"/>
+            <a:ext cx="2408949" cy="861774"/>
+          </a:xfrm>
+          <a:prstGeom prst="rect">
+            <a:avLst/>
+          </a:prstGeom>
+          <a:noFill/>
+        </p:spPr>
+        <p:txBody>
+          <a:bodyPr wrap="square" rtlCol="0">
+            <a:spAutoFit/>
+          </a:bodyPr>
+          <a:lstStyle/>
+          <a:p>
+            <a:r>
+              <a:rPr lang="en-US" sz="1000" b="1" i="1" dirty="0"/>
+              <a:t>Located in </a:t>
+            </a:r>
+            <a:r>
+              <a:rPr lang="en-US" sz="1000" b="1" i="1" dirty="0" err="1"/>
+              <a:t>OLNOLTimecourses</a:t>
+            </a:r>
+            <a:r>
+              <a:rPr lang="en-US" sz="1000" b="1" i="1" dirty="0"/>
+              <a:t> </a:t>
+            </a:r>
+            <a:r>
+              <a:rPr lang="en-US" sz="1000" b="1" i="1" dirty="0" err="1"/>
+              <a:t>github</a:t>
+            </a:r>
+            <a:r>
+              <a:rPr lang="en-US" sz="1000" b="1" i="1" dirty="0"/>
+              <a:t> repo</a:t>
+            </a:r>
+            <a:r>
+              <a:rPr lang="en-US" sz="1000" i="1" dirty="0"/>
+              <a:t> – a pain to set up, but it can generate pretty illustrations of the MVPA weights for different timepoints in the maze overlaid on a map of the maze</a:t>
+            </a:r>
+          </a:p>
+        </p:txBody>
+      </p:sp>
+      <p:sp>
+        <p:nvSpPr>
+          <p:cNvPr id="34" name="TextBox 33">
+            <a:extLst>
+              <a:ext uri="{FF2B5EF4-FFF2-40B4-BE49-F238E27FC236}">
+                <a16:creationId xmlns:a16="http://schemas.microsoft.com/office/drawing/2014/main" id="{C17CC052-2E8D-29B9-289C-85E88B1B9337}"/>
+              </a:ext>
+            </a:extLst>
+          </p:cNvPr>
+          <p:cNvSpPr txBox="1"/>
+          <p:nvPr/>
+        </p:nvSpPr>
+        <p:spPr>
+          <a:xfrm>
+            <a:off x="7996596" y="5533600"/>
+            <a:ext cx="2758009" cy="553998"/>
+          </a:xfrm>
+          <a:prstGeom prst="rect">
+            <a:avLst/>
+          </a:prstGeom>
+          <a:noFill/>
+        </p:spPr>
+        <p:txBody>
+          <a:bodyPr wrap="square" rtlCol="0">
+            <a:spAutoFit/>
+          </a:bodyPr>
+          <a:lstStyle/>
+          <a:p>
+            <a:r>
+              <a:rPr lang="en-US" sz="1000" u="sng" dirty="0"/>
+              <a:t>Excel, R-Studio, whatever you like – you can crunch numbers on the data in the “res” structure for publication and other plots</a:t>
+            </a:r>
+          </a:p>
+        </p:txBody>
+      </p:sp>
+      <p:sp>
+        <p:nvSpPr>
+          <p:cNvPr id="35" name="TextBox 34">
+            <a:extLst>
+              <a:ext uri="{FF2B5EF4-FFF2-40B4-BE49-F238E27FC236}">
+                <a16:creationId xmlns:a16="http://schemas.microsoft.com/office/drawing/2014/main" id="{476A3AAE-38CF-C39C-641B-2956751A7FB4}"/>
+              </a:ext>
+            </a:extLst>
+          </p:cNvPr>
+          <p:cNvSpPr txBox="1"/>
+          <p:nvPr/>
+        </p:nvSpPr>
+        <p:spPr>
+          <a:xfrm>
+            <a:off x="4244810" y="855551"/>
+            <a:ext cx="2408949" cy="400110"/>
+          </a:xfrm>
+          <a:prstGeom prst="rect">
+            <a:avLst/>
+          </a:prstGeom>
+          <a:noFill/>
+        </p:spPr>
+        <p:txBody>
+          <a:bodyPr wrap="square" rtlCol="0">
+            <a:spAutoFit/>
+          </a:bodyPr>
+          <a:lstStyle/>
+          <a:p>
+            <a:r>
+              <a:rPr lang="en-US" sz="1000" b="1" i="1" dirty="0"/>
+              <a:t>Located in </a:t>
+            </a:r>
+            <a:r>
+              <a:rPr lang="en-US" sz="1000" b="1" i="1" dirty="0" err="1"/>
+              <a:t>OLNOLTimecourses</a:t>
+            </a:r>
+            <a:r>
+              <a:rPr lang="en-US" sz="1000" b="1" i="1" dirty="0"/>
+              <a:t> </a:t>
+            </a:r>
+            <a:r>
+              <a:rPr lang="en-US" sz="1000" b="1" i="1" dirty="0" err="1"/>
+              <a:t>github</a:t>
+            </a:r>
+            <a:r>
+              <a:rPr lang="en-US" sz="1000" b="1" i="1" dirty="0"/>
+              <a:t> repo</a:t>
+            </a:r>
+            <a:endParaRPr lang="en-US" sz="1000" i="1" dirty="0"/>
+          </a:p>
+        </p:txBody>
+      </p:sp>
+      <p:sp>
+        <p:nvSpPr>
+          <p:cNvPr id="36" name="TextBox 35">
+            <a:extLst>
+              <a:ext uri="{FF2B5EF4-FFF2-40B4-BE49-F238E27FC236}">
+                <a16:creationId xmlns:a16="http://schemas.microsoft.com/office/drawing/2014/main" id="{ED7B8536-71AA-6AA6-59B2-F43C077FEA44}"/>
+              </a:ext>
+            </a:extLst>
+          </p:cNvPr>
+          <p:cNvSpPr txBox="1"/>
+          <p:nvPr/>
+        </p:nvSpPr>
+        <p:spPr>
+          <a:xfrm>
+            <a:off x="7723220" y="97882"/>
+            <a:ext cx="607859" cy="246221"/>
+          </a:xfrm>
+          <a:prstGeom prst="rect">
+            <a:avLst/>
+          </a:prstGeom>
+          <a:noFill/>
+          <a:ln>
+            <a:solidFill>
+              <a:schemeClr val="tx1"/>
+            </a:solidFill>
+          </a:ln>
+        </p:spPr>
+        <p:txBody>
+          <a:bodyPr wrap="none" rtlCol="0">
+            <a:spAutoFit/>
+          </a:bodyPr>
+          <a:lstStyle/>
+          <a:p>
+            <a:r>
+              <a:rPr lang="en-US" sz="1000" dirty="0" err="1"/>
+              <a:t>code.m</a:t>
+            </a:r>
+            <a:endParaRPr lang="en-US" sz="1000" dirty="0"/>
+          </a:p>
+        </p:txBody>
+      </p:sp>
+      <p:sp>
+        <p:nvSpPr>
+          <p:cNvPr id="37" name="TextBox 36">
+            <a:extLst>
+              <a:ext uri="{FF2B5EF4-FFF2-40B4-BE49-F238E27FC236}">
+                <a16:creationId xmlns:a16="http://schemas.microsoft.com/office/drawing/2014/main" id="{93C579C3-9840-B4CE-5A73-7F8AF446BFCB}"/>
+              </a:ext>
+            </a:extLst>
+          </p:cNvPr>
+          <p:cNvSpPr txBox="1"/>
+          <p:nvPr/>
+        </p:nvSpPr>
+        <p:spPr>
+          <a:xfrm>
+            <a:off x="9064319" y="97882"/>
+            <a:ext cx="1340432" cy="246221"/>
+          </a:xfrm>
+          <a:prstGeom prst="rect">
+            <a:avLst/>
+          </a:prstGeom>
+          <a:solidFill>
+            <a:schemeClr val="bg1">
+              <a:lumMod val="85000"/>
+            </a:schemeClr>
+          </a:solidFill>
+          <a:ln>
+            <a:solidFill>
+              <a:schemeClr val="tx1"/>
+            </a:solidFill>
+          </a:ln>
+        </p:spPr>
+        <p:txBody>
+          <a:bodyPr wrap="none" rtlCol="0">
+            <a:spAutoFit/>
+          </a:bodyPr>
+          <a:lstStyle/>
+          <a:p>
+            <a:r>
+              <a:rPr lang="en-US" sz="1000" dirty="0" err="1"/>
+              <a:t>Output_of_code.mat</a:t>
+            </a:r>
+            <a:endParaRPr lang="en-US" sz="1000" dirty="0"/>
+          </a:p>
+        </p:txBody>
+      </p:sp>
+      <p:sp>
+        <p:nvSpPr>
+          <p:cNvPr id="38" name="TextBox 37">
+            <a:extLst>
+              <a:ext uri="{FF2B5EF4-FFF2-40B4-BE49-F238E27FC236}">
+                <a16:creationId xmlns:a16="http://schemas.microsoft.com/office/drawing/2014/main" id="{4F4E81B3-A36E-ABA6-C99F-8A06902FF9E5}"/>
+              </a:ext>
+            </a:extLst>
+          </p:cNvPr>
+          <p:cNvSpPr txBox="1"/>
+          <p:nvPr/>
+        </p:nvSpPr>
+        <p:spPr>
+          <a:xfrm>
+            <a:off x="5618124" y="36326"/>
+            <a:ext cx="2056269" cy="369332"/>
+          </a:xfrm>
+          <a:prstGeom prst="rect">
+            <a:avLst/>
+          </a:prstGeom>
+          <a:noFill/>
+        </p:spPr>
+        <p:txBody>
+          <a:bodyPr wrap="none" rtlCol="0">
+            <a:spAutoFit/>
+          </a:bodyPr>
+          <a:lstStyle/>
+          <a:p>
+            <a:r>
+              <a:rPr lang="en-US" dirty="0"/>
+              <a:t>Flow chart legend:</a:t>
+            </a:r>
+          </a:p>
+        </p:txBody>
+      </p:sp>
+      <p:sp>
+        <p:nvSpPr>
+          <p:cNvPr id="40" name="TextBox 39">
+            <a:extLst>
+              <a:ext uri="{FF2B5EF4-FFF2-40B4-BE49-F238E27FC236}">
+                <a16:creationId xmlns:a16="http://schemas.microsoft.com/office/drawing/2014/main" id="{8E25A96C-1B47-E163-7B5D-3113FEF206DF}"/>
+              </a:ext>
+            </a:extLst>
+          </p:cNvPr>
+          <p:cNvSpPr txBox="1"/>
+          <p:nvPr/>
+        </p:nvSpPr>
+        <p:spPr>
+          <a:xfrm>
+            <a:off x="7470747" y="396098"/>
+            <a:ext cx="1112805" cy="246221"/>
+          </a:xfrm>
+          <a:prstGeom prst="rect">
+            <a:avLst/>
+          </a:prstGeom>
+          <a:noFill/>
+        </p:spPr>
+        <p:txBody>
+          <a:bodyPr wrap="none" rtlCol="0">
+            <a:spAutoFit/>
+          </a:bodyPr>
+          <a:lstStyle/>
+          <a:p>
+            <a:r>
+              <a:rPr lang="en-US" sz="1000" i="1" u="sng" dirty="0"/>
+              <a:t>You </a:t>
+            </a:r>
+            <a:r>
+              <a:rPr lang="en-US" sz="1000" i="1" u="sng" dirty="0" err="1"/>
+              <a:t>edit+run</a:t>
+            </a:r>
+            <a:r>
+              <a:rPr lang="en-US" sz="1000" i="1" u="sng" dirty="0"/>
+              <a:t> this</a:t>
+            </a:r>
+          </a:p>
+        </p:txBody>
+      </p:sp>
+      <p:sp>
+        <p:nvSpPr>
+          <p:cNvPr id="41" name="TextBox 40">
+            <a:extLst>
+              <a:ext uri="{FF2B5EF4-FFF2-40B4-BE49-F238E27FC236}">
+                <a16:creationId xmlns:a16="http://schemas.microsoft.com/office/drawing/2014/main" id="{A1976D3A-DDD0-1DE1-591A-5D94E3430D42}"/>
+              </a:ext>
+            </a:extLst>
+          </p:cNvPr>
+          <p:cNvSpPr txBox="1"/>
+          <p:nvPr/>
+        </p:nvSpPr>
+        <p:spPr>
+          <a:xfrm>
+            <a:off x="9043535" y="397394"/>
+            <a:ext cx="1491114" cy="246221"/>
+          </a:xfrm>
+          <a:prstGeom prst="rect">
+            <a:avLst/>
+          </a:prstGeom>
+          <a:noFill/>
+        </p:spPr>
+        <p:txBody>
+          <a:bodyPr wrap="none" rtlCol="0">
+            <a:spAutoFit/>
+          </a:bodyPr>
+          <a:lstStyle/>
+          <a:p>
+            <a:r>
+              <a:rPr lang="en-US" sz="1000" i="1" u="sng" dirty="0"/>
+              <a:t>The code generates this</a:t>
+            </a:r>
+          </a:p>
+        </p:txBody>
+      </p:sp>
+      <p:sp>
+        <p:nvSpPr>
+          <p:cNvPr id="42" name="Arrow: Right 41">
+            <a:extLst>
+              <a:ext uri="{FF2B5EF4-FFF2-40B4-BE49-F238E27FC236}">
+                <a16:creationId xmlns:a16="http://schemas.microsoft.com/office/drawing/2014/main" id="{B52151D9-86C8-6BA0-FE60-99942D59FAB5}"/>
+              </a:ext>
+            </a:extLst>
+          </p:cNvPr>
+          <p:cNvSpPr/>
+          <p:nvPr/>
+        </p:nvSpPr>
+        <p:spPr>
+          <a:xfrm>
+            <a:off x="8606767" y="171837"/>
+            <a:ext cx="226577" cy="132439"/>
+          </a:xfrm>
+          <a:prstGeom prst="rightArrow">
+            <a:avLst/>
+          </a:prstGeom>
+          <a:solidFill>
+            <a:schemeClr val="tx1"/>
+          </a:solidFill>
+          <a:ln>
+            <a:solidFill>
+              <a:schemeClr val="tx1"/>
+            </a:solidFill>
+          </a:ln>
+        </p:spPr>
+        <p:style>
+          <a:lnRef idx="2">
+            <a:schemeClr val="accent1">
+              <a:shade val="15000"/>
+            </a:schemeClr>
+          </a:lnRef>
+          <a:fillRef idx="1">
+            <a:schemeClr val="accent1"/>
+          </a:fillRef>
+          <a:effectRef idx="0">
+            <a:schemeClr val="accent1"/>
+          </a:effectRef>
+          <a:fontRef idx="minor">
+            <a:schemeClr val="lt1"/>
+          </a:fontRef>
+        </p:style>
+        <p:txBody>
+          <a:bodyPr rtlCol="0" anchor="ctr"/>
+          <a:lstStyle/>
+          <a:p>
+            <a:pPr algn="ctr"/>
+            <a:endParaRPr lang="en-US"/>
+          </a:p>
+        </p:txBody>
+      </p:sp>
+      <p:sp>
+        <p:nvSpPr>
+          <p:cNvPr id="43" name="TextBox 42">
+            <a:extLst>
+              <a:ext uri="{FF2B5EF4-FFF2-40B4-BE49-F238E27FC236}">
+                <a16:creationId xmlns:a16="http://schemas.microsoft.com/office/drawing/2014/main" id="{BA4260D2-8101-00CC-3EB4-8F811BB62EB8}"/>
+              </a:ext>
+            </a:extLst>
+          </p:cNvPr>
+          <p:cNvSpPr txBox="1"/>
+          <p:nvPr/>
+        </p:nvSpPr>
+        <p:spPr>
+          <a:xfrm>
+            <a:off x="169682" y="1121825"/>
+            <a:ext cx="2301977" cy="369332"/>
+          </a:xfrm>
+          <a:prstGeom prst="rect">
+            <a:avLst/>
+          </a:prstGeom>
+          <a:noFill/>
+        </p:spPr>
+        <p:txBody>
+          <a:bodyPr wrap="none" rtlCol="0">
+            <a:spAutoFit/>
+          </a:bodyPr>
+          <a:lstStyle/>
+          <a:p>
+            <a:r>
+              <a:rPr lang="en-US" dirty="0"/>
+              <a:t>Preprocess fMRI data</a:t>
+            </a:r>
+          </a:p>
+        </p:txBody>
+      </p:sp>
+      <p:sp>
+        <p:nvSpPr>
+          <p:cNvPr id="44" name="TextBox 43">
+            <a:extLst>
+              <a:ext uri="{FF2B5EF4-FFF2-40B4-BE49-F238E27FC236}">
+                <a16:creationId xmlns:a16="http://schemas.microsoft.com/office/drawing/2014/main" id="{01FFBAF3-8CCA-13C8-FC2B-FD720BBDCC2B}"/>
+              </a:ext>
+            </a:extLst>
+          </p:cNvPr>
+          <p:cNvSpPr txBox="1"/>
+          <p:nvPr/>
+        </p:nvSpPr>
+        <p:spPr>
+          <a:xfrm>
+            <a:off x="169683" y="1736170"/>
+            <a:ext cx="3229768" cy="1661993"/>
+          </a:xfrm>
+          <a:prstGeom prst="rect">
+            <a:avLst/>
+          </a:prstGeom>
+          <a:noFill/>
+        </p:spPr>
+        <p:txBody>
+          <a:bodyPr wrap="square" rtlCol="0">
+            <a:spAutoFit/>
+          </a:bodyPr>
+          <a:lstStyle/>
+          <a:p>
+            <a:r>
+              <a:rPr lang="en-US" dirty="0"/>
+              <a:t>Create a “model file”</a:t>
+            </a:r>
+          </a:p>
+          <a:p>
+            <a:r>
+              <a:rPr lang="en-US" sz="1200" dirty="0"/>
+              <a:t>With names, onsets, durations for the events you want to estimate a </a:t>
+            </a:r>
+            <a:r>
+              <a:rPr lang="en-US" sz="1200" dirty="0" err="1"/>
+              <a:t>timecourse</a:t>
+            </a:r>
+            <a:r>
+              <a:rPr lang="en-US" sz="1200" dirty="0"/>
+              <a:t> from</a:t>
+            </a:r>
+          </a:p>
+          <a:p>
+            <a:endParaRPr lang="en-US" sz="1200" dirty="0"/>
+          </a:p>
+          <a:p>
+            <a:r>
+              <a:rPr lang="en-US" sz="1200" dirty="0"/>
+              <a:t>*note: more events (names) = more </a:t>
+            </a:r>
+            <a:r>
+              <a:rPr lang="en-US" sz="1200" dirty="0" err="1"/>
+              <a:t>timecourses</a:t>
+            </a:r>
+            <a:r>
+              <a:rPr lang="en-US" sz="1200" dirty="0"/>
+              <a:t>, with the </a:t>
+            </a:r>
+            <a:r>
+              <a:rPr lang="en-US" sz="1200" dirty="0" err="1"/>
+              <a:t>timecourses</a:t>
+            </a:r>
+            <a:r>
+              <a:rPr lang="en-US" sz="1200" dirty="0"/>
+              <a:t> for each event type being “the </a:t>
+            </a:r>
+            <a:r>
+              <a:rPr lang="en-US" sz="1200" dirty="0" err="1"/>
+              <a:t>timecourse</a:t>
+            </a:r>
+            <a:r>
+              <a:rPr lang="en-US" sz="1200" dirty="0"/>
+              <a:t> for this event that isn’t explained by the other events”</a:t>
+            </a:r>
+          </a:p>
+        </p:txBody>
+      </p:sp>
+      <p:sp>
+        <p:nvSpPr>
+          <p:cNvPr id="45" name="TextBox 44">
+            <a:extLst>
+              <a:ext uri="{FF2B5EF4-FFF2-40B4-BE49-F238E27FC236}">
+                <a16:creationId xmlns:a16="http://schemas.microsoft.com/office/drawing/2014/main" id="{56420725-835D-643E-060E-517AA1ADE75F}"/>
+              </a:ext>
+            </a:extLst>
+          </p:cNvPr>
+          <p:cNvSpPr txBox="1"/>
+          <p:nvPr/>
+        </p:nvSpPr>
+        <p:spPr>
+          <a:xfrm>
+            <a:off x="169683" y="3599037"/>
+            <a:ext cx="3229768" cy="923330"/>
+          </a:xfrm>
+          <a:prstGeom prst="rect">
+            <a:avLst/>
+          </a:prstGeom>
+          <a:noFill/>
+        </p:spPr>
+        <p:txBody>
+          <a:bodyPr wrap="square" rtlCol="0">
+            <a:spAutoFit/>
+          </a:bodyPr>
+          <a:lstStyle/>
+          <a:p>
+            <a:r>
+              <a:rPr lang="en-US" dirty="0"/>
+              <a:t>Run 1</a:t>
+            </a:r>
+            <a:r>
+              <a:rPr lang="en-US" baseline="30000" dirty="0"/>
+              <a:t>st</a:t>
+            </a:r>
+            <a:r>
+              <a:rPr lang="en-US" dirty="0"/>
+              <a:t>-level analysis in SPM for each subject using the model file</a:t>
+            </a:r>
+            <a:endParaRPr lang="en-US" sz="1200" dirty="0"/>
+          </a:p>
+        </p:txBody>
+      </p:sp>
+      <p:sp>
+        <p:nvSpPr>
+          <p:cNvPr id="47" name="TextBox 46">
+            <a:extLst>
+              <a:ext uri="{FF2B5EF4-FFF2-40B4-BE49-F238E27FC236}">
+                <a16:creationId xmlns:a16="http://schemas.microsoft.com/office/drawing/2014/main" id="{D033921E-74B5-9650-C8B3-0A4AC48C4E57}"/>
+              </a:ext>
+            </a:extLst>
+          </p:cNvPr>
+          <p:cNvSpPr txBox="1"/>
+          <p:nvPr/>
+        </p:nvSpPr>
+        <p:spPr>
+          <a:xfrm>
+            <a:off x="1034846" y="4905010"/>
+            <a:ext cx="688009" cy="246221"/>
+          </a:xfrm>
+          <a:prstGeom prst="rect">
+            <a:avLst/>
+          </a:prstGeom>
+          <a:solidFill>
+            <a:schemeClr val="bg1">
+              <a:lumMod val="85000"/>
+            </a:schemeClr>
+          </a:solidFill>
+          <a:ln>
+            <a:solidFill>
+              <a:schemeClr val="tx1"/>
+            </a:solidFill>
+          </a:ln>
+        </p:spPr>
+        <p:txBody>
+          <a:bodyPr wrap="none" rtlCol="0">
+            <a:spAutoFit/>
+          </a:bodyPr>
+          <a:lstStyle/>
+          <a:p>
+            <a:r>
+              <a:rPr lang="en-US" sz="1000" dirty="0" err="1"/>
+              <a:t>SPM.mat</a:t>
+            </a:r>
+            <a:endParaRPr lang="en-US" sz="1000" dirty="0"/>
+          </a:p>
+        </p:txBody>
+      </p:sp>
+      <p:sp>
+        <p:nvSpPr>
+          <p:cNvPr id="48" name="Arrow: Right 47">
+            <a:extLst>
+              <a:ext uri="{FF2B5EF4-FFF2-40B4-BE49-F238E27FC236}">
+                <a16:creationId xmlns:a16="http://schemas.microsoft.com/office/drawing/2014/main" id="{2D794805-F794-ABC1-5750-93EA3D56223E}"/>
+              </a:ext>
+            </a:extLst>
+          </p:cNvPr>
+          <p:cNvSpPr/>
+          <p:nvPr/>
+        </p:nvSpPr>
+        <p:spPr>
+          <a:xfrm rot="5400000">
+            <a:off x="1265562" y="4609506"/>
+            <a:ext cx="226577" cy="132439"/>
+          </a:xfrm>
+          <a:prstGeom prst="rightArrow">
+            <a:avLst/>
+          </a:prstGeom>
+          <a:solidFill>
+            <a:schemeClr val="tx1"/>
+          </a:solidFill>
+          <a:ln>
+            <a:solidFill>
+              <a:schemeClr val="tx1"/>
+            </a:solidFill>
+          </a:ln>
+        </p:spPr>
+        <p:style>
+          <a:lnRef idx="2">
+            <a:schemeClr val="accent1">
+              <a:shade val="15000"/>
+            </a:schemeClr>
+          </a:lnRef>
+          <a:fillRef idx="1">
+            <a:schemeClr val="accent1"/>
+          </a:fillRef>
+          <a:effectRef idx="0">
+            <a:schemeClr val="accent1"/>
+          </a:effectRef>
+          <a:fontRef idx="minor">
+            <a:schemeClr val="lt1"/>
+          </a:fontRef>
+        </p:style>
+        <p:txBody>
+          <a:bodyPr rtlCol="0" anchor="ctr"/>
+          <a:lstStyle/>
+          <a:p>
+            <a:pPr algn="ctr"/>
+            <a:endParaRPr lang="en-US"/>
+          </a:p>
+        </p:txBody>
+      </p:sp>
+      <p:sp>
+        <p:nvSpPr>
+          <p:cNvPr id="49" name="Arrow: Right 48">
+            <a:extLst>
+              <a:ext uri="{FF2B5EF4-FFF2-40B4-BE49-F238E27FC236}">
+                <a16:creationId xmlns:a16="http://schemas.microsoft.com/office/drawing/2014/main" id="{84073BAC-DD7A-4C1E-A025-0D9B3F28ABAF}"/>
+              </a:ext>
+            </a:extLst>
+          </p:cNvPr>
+          <p:cNvSpPr/>
+          <p:nvPr/>
+        </p:nvSpPr>
+        <p:spPr>
+          <a:xfrm rot="5400000">
+            <a:off x="1265562" y="5315886"/>
+            <a:ext cx="226577" cy="132439"/>
+          </a:xfrm>
+          <a:prstGeom prst="rightArrow">
+            <a:avLst/>
+          </a:prstGeom>
+          <a:solidFill>
+            <a:schemeClr val="tx1"/>
+          </a:solidFill>
+          <a:ln>
+            <a:solidFill>
+              <a:schemeClr val="tx1"/>
+            </a:solidFill>
+          </a:ln>
+        </p:spPr>
+        <p:style>
+          <a:lnRef idx="2">
+            <a:schemeClr val="accent1">
+              <a:shade val="15000"/>
+            </a:schemeClr>
+          </a:lnRef>
+          <a:fillRef idx="1">
+            <a:schemeClr val="accent1"/>
+          </a:fillRef>
+          <a:effectRef idx="0">
+            <a:schemeClr val="accent1"/>
+          </a:effectRef>
+          <a:fontRef idx="minor">
+            <a:schemeClr val="lt1"/>
+          </a:fontRef>
+        </p:style>
+        <p:txBody>
+          <a:bodyPr rtlCol="0" anchor="ctr"/>
+          <a:lstStyle/>
+          <a:p>
+            <a:pPr algn="ctr"/>
+            <a:endParaRPr lang="en-US"/>
+          </a:p>
+        </p:txBody>
+      </p:sp>
+      <p:sp>
+        <p:nvSpPr>
+          <p:cNvPr id="50" name="Arrow: Right 49">
+            <a:extLst>
+              <a:ext uri="{FF2B5EF4-FFF2-40B4-BE49-F238E27FC236}">
+                <a16:creationId xmlns:a16="http://schemas.microsoft.com/office/drawing/2014/main" id="{B2560AEE-7E84-B27C-3E32-23A6734A4F9D}"/>
+              </a:ext>
+            </a:extLst>
+          </p:cNvPr>
+          <p:cNvSpPr/>
+          <p:nvPr/>
+        </p:nvSpPr>
+        <p:spPr>
+          <a:xfrm rot="5400000">
+            <a:off x="1265562" y="3425879"/>
+            <a:ext cx="226577" cy="132439"/>
+          </a:xfrm>
+          <a:prstGeom prst="rightArrow">
+            <a:avLst/>
+          </a:prstGeom>
+          <a:solidFill>
+            <a:schemeClr val="tx1"/>
+          </a:solidFill>
+          <a:ln>
+            <a:solidFill>
+              <a:schemeClr val="tx1"/>
+            </a:solidFill>
+          </a:ln>
+        </p:spPr>
+        <p:style>
+          <a:lnRef idx="2">
+            <a:schemeClr val="accent1">
+              <a:shade val="15000"/>
+            </a:schemeClr>
+          </a:lnRef>
+          <a:fillRef idx="1">
+            <a:schemeClr val="accent1"/>
+          </a:fillRef>
+          <a:effectRef idx="0">
+            <a:schemeClr val="accent1"/>
+          </a:effectRef>
+          <a:fontRef idx="minor">
+            <a:schemeClr val="lt1"/>
+          </a:fontRef>
+        </p:style>
+        <p:txBody>
+          <a:bodyPr rtlCol="0" anchor="ctr"/>
+          <a:lstStyle/>
+          <a:p>
+            <a:pPr algn="ctr"/>
+            <a:endParaRPr lang="en-US"/>
+          </a:p>
+        </p:txBody>
+      </p:sp>
+      <p:sp>
+        <p:nvSpPr>
+          <p:cNvPr id="51" name="Arrow: Right 50">
+            <a:extLst>
+              <a:ext uri="{FF2B5EF4-FFF2-40B4-BE49-F238E27FC236}">
+                <a16:creationId xmlns:a16="http://schemas.microsoft.com/office/drawing/2014/main" id="{C00FBFDB-931F-40BF-C99F-D0C7298288A5}"/>
+              </a:ext>
+            </a:extLst>
+          </p:cNvPr>
+          <p:cNvSpPr/>
+          <p:nvPr/>
+        </p:nvSpPr>
+        <p:spPr>
+          <a:xfrm rot="5400000">
+            <a:off x="1265562" y="1556662"/>
+            <a:ext cx="226577" cy="132439"/>
+          </a:xfrm>
+          <a:prstGeom prst="rightArrow">
+            <a:avLst/>
+          </a:prstGeom>
+          <a:solidFill>
+            <a:schemeClr val="tx1"/>
+          </a:solidFill>
+          <a:ln>
+            <a:solidFill>
+              <a:schemeClr val="tx1"/>
+            </a:solidFill>
+          </a:ln>
+        </p:spPr>
+        <p:style>
+          <a:lnRef idx="2">
+            <a:schemeClr val="accent1">
+              <a:shade val="15000"/>
+            </a:schemeClr>
+          </a:lnRef>
+          <a:fillRef idx="1">
+            <a:schemeClr val="accent1"/>
+          </a:fillRef>
+          <a:effectRef idx="0">
+            <a:schemeClr val="accent1"/>
+          </a:effectRef>
+          <a:fontRef idx="minor">
+            <a:schemeClr val="lt1"/>
+          </a:fontRef>
+        </p:style>
+        <p:txBody>
+          <a:bodyPr rtlCol="0" anchor="ctr"/>
+          <a:lstStyle/>
+          <a:p>
+            <a:pPr algn="ctr"/>
+            <a:endParaRPr lang="en-US"/>
+          </a:p>
+        </p:txBody>
+      </p:sp>
+      <p:sp>
+        <p:nvSpPr>
+          <p:cNvPr id="52" name="TextBox 51">
+            <a:extLst>
+              <a:ext uri="{FF2B5EF4-FFF2-40B4-BE49-F238E27FC236}">
+                <a16:creationId xmlns:a16="http://schemas.microsoft.com/office/drawing/2014/main" id="{B253EFB8-2522-37DB-5267-D61637410BD3}"/>
+              </a:ext>
+            </a:extLst>
+          </p:cNvPr>
+          <p:cNvSpPr txBox="1"/>
+          <p:nvPr/>
+        </p:nvSpPr>
+        <p:spPr>
+          <a:xfrm>
+            <a:off x="536312" y="5655074"/>
+            <a:ext cx="1821332" cy="246221"/>
+          </a:xfrm>
+          <a:prstGeom prst="rect">
+            <a:avLst/>
+          </a:prstGeom>
+          <a:noFill/>
+          <a:ln>
+            <a:solidFill>
+              <a:schemeClr val="tx1"/>
+            </a:solidFill>
+          </a:ln>
+        </p:spPr>
+        <p:txBody>
+          <a:bodyPr wrap="none" rtlCol="0">
+            <a:spAutoFit/>
+          </a:bodyPr>
+          <a:lstStyle/>
+          <a:p>
+            <a:r>
+              <a:rPr lang="en-US" sz="1000" dirty="0"/>
+              <a:t>Liz FIR </a:t>
+            </a:r>
+            <a:r>
+              <a:rPr lang="en-US" sz="1000" dirty="0" err="1"/>
+              <a:t>timecourse</a:t>
+            </a:r>
+            <a:r>
+              <a:rPr lang="en-US" sz="1000" dirty="0"/>
+              <a:t> script(s).m</a:t>
+            </a:r>
+          </a:p>
+        </p:txBody>
+      </p:sp>
+      <p:sp>
+        <p:nvSpPr>
+          <p:cNvPr id="53" name="TextBox 52">
+            <a:extLst>
+              <a:ext uri="{FF2B5EF4-FFF2-40B4-BE49-F238E27FC236}">
+                <a16:creationId xmlns:a16="http://schemas.microsoft.com/office/drawing/2014/main" id="{61F1A1BA-568F-B41E-3621-AB3C7DB55C99}"/>
+              </a:ext>
+            </a:extLst>
+          </p:cNvPr>
+          <p:cNvSpPr txBox="1"/>
+          <p:nvPr/>
+        </p:nvSpPr>
+        <p:spPr>
+          <a:xfrm>
+            <a:off x="649323" y="6381880"/>
+            <a:ext cx="1459054" cy="246221"/>
+          </a:xfrm>
+          <a:prstGeom prst="rect">
+            <a:avLst/>
+          </a:prstGeom>
+          <a:solidFill>
+            <a:schemeClr val="bg1">
+              <a:lumMod val="85000"/>
+            </a:schemeClr>
+          </a:solidFill>
+          <a:ln>
+            <a:solidFill>
+              <a:schemeClr val="tx1"/>
+            </a:solidFill>
+          </a:ln>
+        </p:spPr>
+        <p:txBody>
+          <a:bodyPr wrap="none" rtlCol="0">
+            <a:spAutoFit/>
+          </a:bodyPr>
+          <a:lstStyle/>
+          <a:p>
+            <a:r>
+              <a:rPr lang="en-US" sz="1000" dirty="0" err="1"/>
+              <a:t>indiv_timecourses.mat</a:t>
+            </a:r>
+            <a:endParaRPr lang="en-US" sz="1000" dirty="0"/>
+          </a:p>
+        </p:txBody>
+      </p:sp>
+      <p:sp>
+        <p:nvSpPr>
+          <p:cNvPr id="54" name="Arrow: Right 53">
+            <a:extLst>
+              <a:ext uri="{FF2B5EF4-FFF2-40B4-BE49-F238E27FC236}">
+                <a16:creationId xmlns:a16="http://schemas.microsoft.com/office/drawing/2014/main" id="{4873ACCB-3FB8-CBA4-767C-6815A4286194}"/>
+              </a:ext>
+            </a:extLst>
+          </p:cNvPr>
+          <p:cNvSpPr/>
+          <p:nvPr/>
+        </p:nvSpPr>
+        <p:spPr>
+          <a:xfrm rot="5400000">
+            <a:off x="1265562" y="6085137"/>
+            <a:ext cx="226577" cy="132439"/>
+          </a:xfrm>
+          <a:prstGeom prst="rightArrow">
+            <a:avLst/>
+          </a:prstGeom>
+          <a:solidFill>
+            <a:schemeClr val="tx1"/>
+          </a:solidFill>
+          <a:ln>
+            <a:solidFill>
+              <a:schemeClr val="tx1"/>
+            </a:solidFill>
+          </a:ln>
+        </p:spPr>
+        <p:style>
+          <a:lnRef idx="2">
+            <a:schemeClr val="accent1">
+              <a:shade val="15000"/>
+            </a:schemeClr>
+          </a:lnRef>
+          <a:fillRef idx="1">
+            <a:schemeClr val="accent1"/>
+          </a:fillRef>
+          <a:effectRef idx="0">
+            <a:schemeClr val="accent1"/>
+          </a:effectRef>
+          <a:fontRef idx="minor">
+            <a:schemeClr val="lt1"/>
+          </a:fontRef>
+        </p:style>
+        <p:txBody>
+          <a:bodyPr rtlCol="0" anchor="ctr"/>
+          <a:lstStyle/>
+          <a:p>
+            <a:pPr algn="ctr"/>
+            <a:endParaRPr lang="en-US"/>
+          </a:p>
+        </p:txBody>
+      </p:sp>
+      <p:sp>
+        <p:nvSpPr>
+          <p:cNvPr id="63" name="Arrow: Right 62">
+            <a:extLst>
+              <a:ext uri="{FF2B5EF4-FFF2-40B4-BE49-F238E27FC236}">
+                <a16:creationId xmlns:a16="http://schemas.microsoft.com/office/drawing/2014/main" id="{57A9DDDA-D527-7453-B845-35E1498E8CC4}"/>
+              </a:ext>
+            </a:extLst>
+          </p:cNvPr>
+          <p:cNvSpPr/>
+          <p:nvPr/>
+        </p:nvSpPr>
+        <p:spPr>
+          <a:xfrm>
+            <a:off x="3528293" y="1211259"/>
+            <a:ext cx="560363" cy="154178"/>
+          </a:xfrm>
+          <a:prstGeom prst="rightArrow">
+            <a:avLst/>
+          </a:prstGeom>
+          <a:solidFill>
+            <a:schemeClr val="tx1"/>
+          </a:solidFill>
+          <a:ln>
+            <a:solidFill>
+              <a:schemeClr val="tx1"/>
+            </a:solidFill>
+          </a:ln>
+        </p:spPr>
+        <p:style>
+          <a:lnRef idx="2">
+            <a:schemeClr val="accent1">
+              <a:shade val="15000"/>
+            </a:schemeClr>
+          </a:lnRef>
+          <a:fillRef idx="1">
+            <a:schemeClr val="accent1"/>
+          </a:fillRef>
+          <a:effectRef idx="0">
+            <a:schemeClr val="accent1"/>
+          </a:effectRef>
+          <a:fontRef idx="minor">
+            <a:schemeClr val="lt1"/>
+          </a:fontRef>
+        </p:style>
+        <p:txBody>
+          <a:bodyPr rtlCol="0" anchor="ctr"/>
+          <a:lstStyle/>
+          <a:p>
+            <a:pPr algn="ctr"/>
+            <a:endParaRPr lang="en-US"/>
+          </a:p>
+        </p:txBody>
+      </p:sp>
+      <p:cxnSp>
+        <p:nvCxnSpPr>
+          <p:cNvPr id="65" name="Straight Connector 64">
+            <a:extLst>
+              <a:ext uri="{FF2B5EF4-FFF2-40B4-BE49-F238E27FC236}">
+                <a16:creationId xmlns:a16="http://schemas.microsoft.com/office/drawing/2014/main" id="{1842DB07-723C-DF39-924F-C5E90FBB9BF9}"/>
+              </a:ext>
+            </a:extLst>
+          </p:cNvPr>
+          <p:cNvCxnSpPr>
+            <a:cxnSpLocks/>
+          </p:cNvCxnSpPr>
+          <p:nvPr/>
+        </p:nvCxnSpPr>
+        <p:spPr>
+          <a:xfrm>
+            <a:off x="3528293" y="1230344"/>
+            <a:ext cx="0" cy="5227511"/>
+          </a:xfrm>
+          <a:prstGeom prst="line">
+            <a:avLst/>
+          </a:prstGeom>
+          <a:ln w="82550">
+            <a:solidFill>
+              <a:schemeClr val="tx1"/>
+            </a:solidFill>
+          </a:ln>
+        </p:spPr>
+        <p:style>
+          <a:lnRef idx="2">
+            <a:schemeClr val="accent1"/>
+          </a:lnRef>
+          <a:fillRef idx="0">
+            <a:schemeClr val="accent1"/>
+          </a:fillRef>
+          <a:effectRef idx="1">
+            <a:schemeClr val="accent1"/>
+          </a:effectRef>
+          <a:fontRef idx="minor">
+            <a:schemeClr val="tx1"/>
+          </a:fontRef>
+        </p:style>
+      </p:cxnSp>
+      <p:cxnSp>
+        <p:nvCxnSpPr>
+          <p:cNvPr id="66" name="Straight Connector 65">
+            <a:extLst>
+              <a:ext uri="{FF2B5EF4-FFF2-40B4-BE49-F238E27FC236}">
+                <a16:creationId xmlns:a16="http://schemas.microsoft.com/office/drawing/2014/main" id="{11A0BA45-6477-36C4-B0FD-1151726AF0E7}"/>
+              </a:ext>
+            </a:extLst>
+          </p:cNvPr>
+          <p:cNvCxnSpPr>
+            <a:cxnSpLocks/>
+          </p:cNvCxnSpPr>
+          <p:nvPr/>
+        </p:nvCxnSpPr>
+        <p:spPr>
+          <a:xfrm>
+            <a:off x="2290713" y="6507055"/>
+            <a:ext cx="1276858" cy="0"/>
+          </a:xfrm>
+          <a:prstGeom prst="line">
+            <a:avLst/>
+          </a:prstGeom>
+          <a:ln w="82550">
+            <a:solidFill>
+              <a:schemeClr val="tx1"/>
+            </a:solidFill>
+          </a:ln>
+        </p:spPr>
+        <p:style>
+          <a:lnRef idx="2">
+            <a:schemeClr val="accent1"/>
+          </a:lnRef>
+          <a:fillRef idx="0">
+            <a:schemeClr val="accent1"/>
+          </a:fillRef>
+          <a:effectRef idx="1">
+            <a:schemeClr val="accent1"/>
+          </a:effectRef>
+          <a:fontRef idx="minor">
+            <a:schemeClr val="tx1"/>
+          </a:fontRef>
+        </p:style>
+      </p:cxnSp>
     </p:spTree>
     <p:extLst>
       <p:ext uri="{BB962C8B-B14F-4D97-AF65-F5344CB8AC3E}">

</xml_diff>